<commit_message>
new study area map from emily
</commit_message>
<xml_diff>
--- a/Figures/CombineMapBarplot.pptx
+++ b/Figures/CombineMapBarplot.pptx
@@ -104,6 +104,11 @@
       </a:defRPr>
     </a:lvl9pPr>
   </p:defaultTextStyle>
+  <p:extLst>
+    <p:ext uri="{EFAFB233-063F-42B5-8137-9DF3F51BA10A}">
+      <p15:sldGuideLst xmlns:p15="http://schemas.microsoft.com/office/powerpoint/2012/main"/>
+    </p:ext>
+  </p:extLst>
 </p:presentation>
 </file>
 
@@ -254,7 +259,7 @@
           <a:p>
             <a:fld id="{38B263A4-A462-4F64-AC67-FD39BDBDC6BA}" type="datetimeFigureOut">
               <a:rPr lang="en-US" smtClean="0"/>
-              <a:t>1/24/2023</a:t>
+              <a:t>1/28/2023</a:t>
             </a:fld>
             <a:endParaRPr lang="en-US"/>
           </a:p>
@@ -452,7 +457,7 @@
           <a:p>
             <a:fld id="{38B263A4-A462-4F64-AC67-FD39BDBDC6BA}" type="datetimeFigureOut">
               <a:rPr lang="en-US" smtClean="0"/>
-              <a:t>1/24/2023</a:t>
+              <a:t>1/28/2023</a:t>
             </a:fld>
             <a:endParaRPr lang="en-US"/>
           </a:p>
@@ -660,7 +665,7 @@
           <a:p>
             <a:fld id="{38B263A4-A462-4F64-AC67-FD39BDBDC6BA}" type="datetimeFigureOut">
               <a:rPr lang="en-US" smtClean="0"/>
-              <a:t>1/24/2023</a:t>
+              <a:t>1/28/2023</a:t>
             </a:fld>
             <a:endParaRPr lang="en-US"/>
           </a:p>
@@ -858,7 +863,7 @@
           <a:p>
             <a:fld id="{38B263A4-A462-4F64-AC67-FD39BDBDC6BA}" type="datetimeFigureOut">
               <a:rPr lang="en-US" smtClean="0"/>
-              <a:t>1/24/2023</a:t>
+              <a:t>1/28/2023</a:t>
             </a:fld>
             <a:endParaRPr lang="en-US"/>
           </a:p>
@@ -1133,7 +1138,7 @@
           <a:p>
             <a:fld id="{38B263A4-A462-4F64-AC67-FD39BDBDC6BA}" type="datetimeFigureOut">
               <a:rPr lang="en-US" smtClean="0"/>
-              <a:t>1/24/2023</a:t>
+              <a:t>1/28/2023</a:t>
             </a:fld>
             <a:endParaRPr lang="en-US"/>
           </a:p>
@@ -1398,7 +1403,7 @@
           <a:p>
             <a:fld id="{38B263A4-A462-4F64-AC67-FD39BDBDC6BA}" type="datetimeFigureOut">
               <a:rPr lang="en-US" smtClean="0"/>
-              <a:t>1/24/2023</a:t>
+              <a:t>1/28/2023</a:t>
             </a:fld>
             <a:endParaRPr lang="en-US"/>
           </a:p>
@@ -1810,7 +1815,7 @@
           <a:p>
             <a:fld id="{38B263A4-A462-4F64-AC67-FD39BDBDC6BA}" type="datetimeFigureOut">
               <a:rPr lang="en-US" smtClean="0"/>
-              <a:t>1/24/2023</a:t>
+              <a:t>1/28/2023</a:t>
             </a:fld>
             <a:endParaRPr lang="en-US"/>
           </a:p>
@@ -1951,7 +1956,7 @@
           <a:p>
             <a:fld id="{38B263A4-A462-4F64-AC67-FD39BDBDC6BA}" type="datetimeFigureOut">
               <a:rPr lang="en-US" smtClean="0"/>
-              <a:t>1/24/2023</a:t>
+              <a:t>1/28/2023</a:t>
             </a:fld>
             <a:endParaRPr lang="en-US"/>
           </a:p>
@@ -2064,7 +2069,7 @@
           <a:p>
             <a:fld id="{38B263A4-A462-4F64-AC67-FD39BDBDC6BA}" type="datetimeFigureOut">
               <a:rPr lang="en-US" smtClean="0"/>
-              <a:t>1/24/2023</a:t>
+              <a:t>1/28/2023</a:t>
             </a:fld>
             <a:endParaRPr lang="en-US"/>
           </a:p>
@@ -2375,7 +2380,7 @@
           <a:p>
             <a:fld id="{38B263A4-A462-4F64-AC67-FD39BDBDC6BA}" type="datetimeFigureOut">
               <a:rPr lang="en-US" smtClean="0"/>
-              <a:t>1/24/2023</a:t>
+              <a:t>1/28/2023</a:t>
             </a:fld>
             <a:endParaRPr lang="en-US"/>
           </a:p>
@@ -2663,7 +2668,7 @@
           <a:p>
             <a:fld id="{38B263A4-A462-4F64-AC67-FD39BDBDC6BA}" type="datetimeFigureOut">
               <a:rPr lang="en-US" smtClean="0"/>
-              <a:t>1/24/2023</a:t>
+              <a:t>1/28/2023</a:t>
             </a:fld>
             <a:endParaRPr lang="en-US"/>
           </a:p>
@@ -2904,7 +2909,7 @@
           <a:p>
             <a:fld id="{38B263A4-A462-4F64-AC67-FD39BDBDC6BA}" type="datetimeFigureOut">
               <a:rPr lang="en-US" smtClean="0"/>
-              <a:t>1/24/2023</a:t>
+              <a:t>1/28/2023</a:t>
             </a:fld>
             <a:endParaRPr lang="en-US"/>
           </a:p>
@@ -3323,87 +3328,6 @@
       </p:grpSpPr>
       <p:pic>
         <p:nvPicPr>
-          <p:cNvPr id="5" name="Picture 4">
-            <a:extLst>
-              <a:ext uri="{FF2B5EF4-FFF2-40B4-BE49-F238E27FC236}">
-                <a16:creationId xmlns:a16="http://schemas.microsoft.com/office/drawing/2014/main" id="{F5990888-FC4E-8E9A-8D46-81C1E12E98F1}"/>
-              </a:ext>
-            </a:extLst>
-          </p:cNvPr>
-          <p:cNvPicPr>
-            <a:picLocks noChangeAspect="1"/>
-          </p:cNvPicPr>
-          <p:nvPr/>
-        </p:nvPicPr>
-        <p:blipFill rotWithShape="1">
-          <a:blip r:embed="rId2">
-            <a:extLst>
-              <a:ext uri="{28A0092B-C50C-407E-A947-70E740481C1C}">
-                <a14:useLocalDpi xmlns:a14="http://schemas.microsoft.com/office/drawing/2010/main" val="0"/>
-              </a:ext>
-            </a:extLst>
-          </a:blip>
-          <a:srcRect l="8833" t="6744" r="8618" b="7130"/>
-          <a:stretch/>
-        </p:blipFill>
-        <p:spPr>
-          <a:xfrm>
-            <a:off x="600501" y="462517"/>
-            <a:ext cx="3747690" cy="5063341"/>
-          </a:xfrm>
-          <a:prstGeom prst="rect">
-            <a:avLst/>
-          </a:prstGeom>
-          <a:ln>
-            <a:solidFill>
-              <a:schemeClr val="tx1"/>
-            </a:solidFill>
-          </a:ln>
-        </p:spPr>
-      </p:pic>
-      <p:sp>
-        <p:nvSpPr>
-          <p:cNvPr id="10" name="TextBox 9">
-            <a:extLst>
-              <a:ext uri="{FF2B5EF4-FFF2-40B4-BE49-F238E27FC236}">
-                <a16:creationId xmlns:a16="http://schemas.microsoft.com/office/drawing/2014/main" id="{41FC8EDE-193D-6B55-9889-5778888D73F8}"/>
-              </a:ext>
-            </a:extLst>
-          </p:cNvPr>
-          <p:cNvSpPr txBox="1"/>
-          <p:nvPr/>
-        </p:nvSpPr>
-        <p:spPr>
-          <a:xfrm>
-            <a:off x="600501" y="462517"/>
-            <a:ext cx="504967" cy="338554"/>
-          </a:xfrm>
-          <a:prstGeom prst="rect">
-            <a:avLst/>
-          </a:prstGeom>
-          <a:noFill/>
-        </p:spPr>
-        <p:txBody>
-          <a:bodyPr wrap="square" rtlCol="0">
-            <a:spAutoFit/>
-          </a:bodyPr>
-          <a:lstStyle/>
-          <a:p>
-            <a:r>
-              <a:rPr lang="en-US" sz="1600" dirty="0">
-                <a:solidFill>
-                  <a:schemeClr val="bg1"/>
-                </a:solidFill>
-                <a:latin typeface="Arial" panose="020B0604020202020204" pitchFamily="34" charset="0"/>
-                <a:cs typeface="Arial" panose="020B0604020202020204" pitchFamily="34" charset="0"/>
-              </a:rPr>
-              <a:t>A)</a:t>
-            </a:r>
-          </a:p>
-        </p:txBody>
-      </p:sp>
-      <p:pic>
-        <p:nvPicPr>
           <p:cNvPr id="12" name="Picture 11">
             <a:extLst>
               <a:ext uri="{FF2B5EF4-FFF2-40B4-BE49-F238E27FC236}">
@@ -3417,7 +3341,7 @@
           <p:nvPr/>
         </p:nvPicPr>
         <p:blipFill>
-          <a:blip r:embed="rId3">
+          <a:blip r:embed="rId2">
             <a:extLst>
               <a:ext uri="{28A0092B-C50C-407E-A947-70E740481C1C}">
                 <a14:useLocalDpi xmlns:a14="http://schemas.microsoft.com/office/drawing/2010/main" val="0"/>
@@ -3430,7 +3354,7 @@
         </p:blipFill>
         <p:spPr>
           <a:xfrm>
-            <a:off x="4451445" y="462517"/>
+            <a:off x="4508597" y="462517"/>
             <a:ext cx="7088676" cy="5063340"/>
           </a:xfrm>
           <a:prstGeom prst="rect">
@@ -3443,6 +3367,88 @@
           </a:ln>
         </p:spPr>
       </p:pic>
+      <p:pic>
+        <p:nvPicPr>
+          <p:cNvPr id="3" name="Picture 2">
+            <a:extLst>
+              <a:ext uri="{FF2B5EF4-FFF2-40B4-BE49-F238E27FC236}">
+                <a16:creationId xmlns:a16="http://schemas.microsoft.com/office/drawing/2014/main" id="{0E0401D5-295A-516A-2245-46B75C9F4180}"/>
+              </a:ext>
+            </a:extLst>
+          </p:cNvPr>
+          <p:cNvPicPr>
+            <a:picLocks noChangeAspect="1"/>
+          </p:cNvPicPr>
+          <p:nvPr/>
+        </p:nvPicPr>
+        <p:blipFill>
+          <a:blip r:embed="rId3">
+            <a:extLst>
+              <a:ext uri="{28A0092B-C50C-407E-A947-70E740481C1C}">
+                <a14:useLocalDpi xmlns:a14="http://schemas.microsoft.com/office/drawing/2010/main" val="0"/>
+              </a:ext>
+            </a:extLst>
+          </a:blip>
+          <a:stretch>
+            <a:fillRect/>
+          </a:stretch>
+        </p:blipFill>
+        <p:spPr>
+          <a:xfrm>
+            <a:off x="538864" y="462517"/>
+            <a:ext cx="3912581" cy="5063340"/>
+          </a:xfrm>
+          <a:prstGeom prst="rect">
+            <a:avLst/>
+          </a:prstGeom>
+          <a:ln>
+            <a:solidFill>
+              <a:schemeClr val="tx1"/>
+            </a:solidFill>
+          </a:ln>
+        </p:spPr>
+      </p:pic>
+      <p:sp>
+        <p:nvSpPr>
+          <p:cNvPr id="10" name="TextBox 9">
+            <a:extLst>
+              <a:ext uri="{FF2B5EF4-FFF2-40B4-BE49-F238E27FC236}">
+                <a16:creationId xmlns:a16="http://schemas.microsoft.com/office/drawing/2014/main" id="{41FC8EDE-193D-6B55-9889-5778888D73F8}"/>
+              </a:ext>
+            </a:extLst>
+          </p:cNvPr>
+          <p:cNvSpPr txBox="1"/>
+          <p:nvPr/>
+        </p:nvSpPr>
+        <p:spPr>
+          <a:xfrm>
+            <a:off x="600501" y="462517"/>
+            <a:ext cx="504967" cy="338554"/>
+          </a:xfrm>
+          <a:prstGeom prst="rect">
+            <a:avLst/>
+          </a:prstGeom>
+          <a:noFill/>
+        </p:spPr>
+        <p:txBody>
+          <a:bodyPr wrap="square" rtlCol="0">
+            <a:spAutoFit/>
+          </a:bodyPr>
+          <a:lstStyle/>
+          <a:p>
+            <a:r>
+              <a:rPr lang="en-US" sz="1600" dirty="0">
+                <a:solidFill>
+                  <a:schemeClr val="bg1"/>
+                </a:solidFill>
+                <a:latin typeface="Arial" panose="020B0604020202020204" pitchFamily="34" charset="0"/>
+                <a:cs typeface="Arial" panose="020B0604020202020204" pitchFamily="34" charset="0"/>
+              </a:rPr>
+              <a:t>A)</a:t>
+            </a:r>
+          </a:p>
+        </p:txBody>
+      </p:sp>
     </p:spTree>
     <p:extLst>
       <p:ext uri="{BB962C8B-B14F-4D97-AF65-F5344CB8AC3E}">

</xml_diff>